<commit_message>
Small edits to part 1-3 slides, adding details to SVM challenges section
</commit_message>
<xml_diff>
--- a/projects/project_1/results/Project_1_Presentation.pptx
+++ b/projects/project_1/results/Project_1_Presentation.pptx
@@ -13,7 +13,7 @@
     <p:sldId id="261" r:id="rId7"/>
     <p:sldId id="264" r:id="rId8"/>
     <p:sldId id="274" r:id="rId9"/>
-    <p:sldId id="277" r:id="rId10"/>
+    <p:sldId id="289" r:id="rId10"/>
     <p:sldId id="265" r:id="rId11"/>
     <p:sldId id="281" r:id="rId12"/>
     <p:sldId id="278" r:id="rId13"/>
@@ -1233,7 +1233,7 @@
           <a:p>
             <a:fld id="{B6FD6BE2-EA2E-6E41-9967-AB7622447780}" type="datetimeFigureOut">
               <a:rPr lang="en-US" smtClean="0"/>
-              <a:t>9/27/25</a:t>
+              <a:t>9/28/25</a:t>
             </a:fld>
             <a:endParaRPr lang="en-US"/>
           </a:p>
@@ -46858,6 +46858,64 @@
           </a:prstGeom>
         </p:spPr>
       </p:pic>
+      <p:sp>
+        <p:nvSpPr>
+          <p:cNvPr id="2" name="Rectangle 1">
+            <a:extLst>
+              <a:ext uri="{FF2B5EF4-FFF2-40B4-BE49-F238E27FC236}">
+                <a16:creationId xmlns:a16="http://schemas.microsoft.com/office/drawing/2014/main" id="{C237452E-FD04-B2D1-B3AF-6CAB6BE4D573}"/>
+              </a:ext>
+            </a:extLst>
+          </p:cNvPr>
+          <p:cNvSpPr/>
+          <p:nvPr/>
+        </p:nvSpPr>
+        <p:spPr>
+          <a:xfrm>
+            <a:off x="2623457" y="3526970"/>
+            <a:ext cx="1872343" cy="1839687"/>
+          </a:xfrm>
+          <a:prstGeom prst="rect">
+            <a:avLst/>
+          </a:prstGeom>
+          <a:solidFill>
+            <a:schemeClr val="bg2">
+              <a:lumMod val="60000"/>
+              <a:lumOff val="40000"/>
+              <a:alpha val="23137"/>
+            </a:schemeClr>
+          </a:solidFill>
+          <a:ln>
+            <a:solidFill>
+              <a:schemeClr val="bg2"/>
+            </a:solidFill>
+          </a:ln>
+        </p:spPr>
+        <p:style>
+          <a:lnRef idx="2">
+            <a:schemeClr val="accent1">
+              <a:shade val="15000"/>
+            </a:schemeClr>
+          </a:lnRef>
+          <a:fillRef idx="1">
+            <a:schemeClr val="accent1"/>
+          </a:fillRef>
+          <a:effectRef idx="0">
+            <a:schemeClr val="accent1"/>
+          </a:effectRef>
+          <a:fontRef idx="minor">
+            <a:schemeClr val="lt1"/>
+          </a:fontRef>
+        </p:style>
+        <p:txBody>
+          <a:bodyPr rtlCol="0" anchor="ctr"/>
+          <a:lstStyle/>
+          <a:p>
+            <a:pPr algn="ctr"/>
+            <a:endParaRPr lang="en-US"/>
+          </a:p>
+        </p:txBody>
+      </p:sp>
     </p:spTree>
     <p:extLst>
       <p:ext uri="{BB962C8B-B14F-4D97-AF65-F5344CB8AC3E}">
@@ -47914,8 +47972,8 @@
         </p:nvSpPr>
         <p:spPr>
           <a:xfrm>
-            <a:off x="959920" y="2375743"/>
-            <a:ext cx="2907711" cy="3543794"/>
+            <a:off x="959920" y="2375742"/>
+            <a:ext cx="2907711" cy="3888889"/>
           </a:xfrm>
           <a:prstGeom prst="rect">
             <a:avLst/>
@@ -48044,7 +48102,7 @@
         <p:spPr>
           <a:xfrm>
             <a:off x="3867632" y="2375743"/>
-            <a:ext cx="4456667" cy="3543794"/>
+            <a:ext cx="4456667" cy="3888890"/>
           </a:xfrm>
           <a:prstGeom prst="rect">
             <a:avLst/>
@@ -48061,6 +48119,17 @@
           </a:bodyPr>
           <a:lstStyle/>
           <a:p>
+            <a:pPr marL="152400" indent="0">
+              <a:spcAft>
+                <a:spcPts val="600"/>
+              </a:spcAft>
+            </a:pPr>
+            <a:r>
+              <a:rPr lang="en-US" b="1" dirty="0"/>
+              <a:t>Kernel tuning done separately: </a:t>
+            </a:r>
+          </a:p>
+          <a:p>
             <a:pPr marL="323850" indent="-171450">
               <a:spcAft>
                 <a:spcPts val="600"/>
@@ -48070,7 +48139,7 @@
             </a:pPr>
             <a:r>
               <a:rPr lang="en-US" dirty="0"/>
-              <a:t>Multiple kernel selection and parameter tuning</a:t>
+              <a:t>Full grid search avoided due to long run times</a:t>
             </a:r>
           </a:p>
           <a:p>
@@ -48083,7 +48152,22 @@
             </a:pPr>
             <a:r>
               <a:rPr lang="en-US" dirty="0"/>
-              <a:t>Computational complexity with RBF kernel</a:t>
+              <a:t>Each kernel was tuned in its own cross-validation loop</a:t>
+            </a:r>
+          </a:p>
+          <a:p>
+            <a:pPr marL="152400" indent="0">
+              <a:spcAft>
+                <a:spcPts val="600"/>
+              </a:spcAft>
+            </a:pPr>
+            <a:r>
+              <a:rPr lang="en-US" b="1" dirty="0"/>
+              <a:t>Poly kernel was most computationally expensive</a:t>
+            </a:r>
+            <a:r>
+              <a:rPr lang="en-US" dirty="0"/>
+              <a:t>:</a:t>
             </a:r>
           </a:p>
           <a:p>
@@ -48096,7 +48180,22 @@
             </a:pPr>
             <a:r>
               <a:rPr lang="en-US" dirty="0"/>
-              <a:t>Cross-validation time for multiple parameter combinations</a:t>
+              <a:t>Especially with gamma='auto', it was excluded due to excessive training time</a:t>
+            </a:r>
+          </a:p>
+          <a:p>
+            <a:pPr marL="152400" indent="0">
+              <a:spcAft>
+                <a:spcPts val="600"/>
+              </a:spcAft>
+            </a:pPr>
+            <a:r>
+              <a:rPr lang="en-US" b="1" dirty="0"/>
+              <a:t>RBF kernel complexity</a:t>
+            </a:r>
+            <a:r>
+              <a:rPr lang="en-US" dirty="0"/>
+              <a:t>: </a:t>
             </a:r>
           </a:p>
           <a:p>
@@ -48109,7 +48208,22 @@
             </a:pPr>
             <a:r>
               <a:rPr lang="en-US" dirty="0"/>
-              <a:t>Feature dimensionality (95 features) affecting performance</a:t>
+              <a:t>Still computationally intensive, but more manageable than poly in high-dimensional space</a:t>
+            </a:r>
+          </a:p>
+          <a:p>
+            <a:pPr marL="152400" indent="0">
+              <a:spcAft>
+                <a:spcPts val="600"/>
+              </a:spcAft>
+            </a:pPr>
+            <a:r>
+              <a:rPr lang="en-US" b="1" dirty="0"/>
+              <a:t>High feature dimensionality</a:t>
+            </a:r>
+            <a:r>
+              <a:rPr lang="en-US" dirty="0"/>
+              <a:t> (&gt;100 features):</a:t>
             </a:r>
           </a:p>
           <a:p>
@@ -48122,9 +48236,47 @@
             </a:pPr>
             <a:r>
               <a:rPr lang="en-US" dirty="0"/>
-              <a:t>Balancing model complexity vs. interpretability</a:t>
+              <a:t>Increased training time and impacted kernel performance</a:t>
             </a:r>
-            <a:endParaRPr dirty="0"/>
+          </a:p>
+          <a:p>
+            <a:pPr marL="152400" indent="0">
+              <a:spcAft>
+                <a:spcPts val="600"/>
+              </a:spcAft>
+            </a:pPr>
+            <a:r>
+              <a:rPr lang="en-US" b="1" dirty="0"/>
+              <a:t>Graphing</a:t>
+            </a:r>
+            <a:r>
+              <a:rPr lang="en-US" dirty="0"/>
+              <a:t>: </a:t>
+            </a:r>
+          </a:p>
+          <a:p>
+            <a:pPr marL="323850" indent="-171450">
+              <a:spcAft>
+                <a:spcPts val="600"/>
+              </a:spcAft>
+              <a:buFont typeface="Arial" panose="020B0604020202020204" pitchFamily="34" charset="0"/>
+              <a:buChar char="•"/>
+            </a:pPr>
+            <a:r>
+              <a:rPr lang="en-US" b="0" i="0" u="none" strike="noStrike" dirty="0">
+                <a:solidFill>
+                  <a:srgbClr val="000000"/>
+                </a:solidFill>
+                <a:effectLst/>
+                <a:latin typeface="Poppins" pitchFamily="2" charset="77"/>
+                <a:cs typeface="Poppins" pitchFamily="2" charset="77"/>
+              </a:rPr>
+              <a:t>Only graphed decision boundaries for two features using 2 kernels due to runtime constraints</a:t>
+            </a:r>
+            <a:endParaRPr dirty="0">
+              <a:latin typeface="Poppins" pitchFamily="2" charset="77"/>
+              <a:cs typeface="Poppins" pitchFamily="2" charset="77"/>
+            </a:endParaRPr>
           </a:p>
         </p:txBody>
       </p:sp>
@@ -48147,7 +48299,7 @@
         <p:spPr>
           <a:xfrm>
             <a:off x="8324299" y="2375742"/>
-            <a:ext cx="2907701" cy="3543795"/>
+            <a:ext cx="2907701" cy="3888889"/>
           </a:xfrm>
           <a:prstGeom prst="rect">
             <a:avLst/>
@@ -48185,8 +48337,12 @@
               <a:buChar char="•"/>
             </a:pPr>
             <a:r>
+              <a:rPr lang="en-US" b="1" dirty="0"/>
+              <a:t>RBF Kernel</a:t>
+            </a:r>
+            <a:r>
               <a:rPr lang="en-US" dirty="0"/>
-              <a:t>RBF Kernel: 85.49% CV accuracy (C=1, gamma='scale'), 85.00% test accuracy</a:t>
+              <a:t>: 85.49% CV accuracy (C=1, gamma='scale'), 85.00% test accuracy</a:t>
             </a:r>
           </a:p>
           <a:p>
@@ -48211,8 +48367,12 @@
               <a:buChar char="•"/>
             </a:pPr>
             <a:r>
+              <a:rPr lang="en-US" b="1" dirty="0"/>
+              <a:t>Best Overall</a:t>
+            </a:r>
+            <a:r>
               <a:rPr lang="en-US" dirty="0"/>
-              <a:t>Best Overall: RBF kernel with C=1, gamma='scale'</a:t>
+              <a:t>: RBF kernel with C=1, gamma='scale'</a:t>
             </a:r>
           </a:p>
           <a:p>
@@ -50589,7 +50749,7 @@
             </a:pPr>
             <a:r>
               <a:rPr lang="en-US" dirty="0"/>
-              <a:t>Started with one-hot encoding</a:t>
+              <a:t>One-hot encoding increased feature count​</a:t>
             </a:r>
           </a:p>
           <a:p>
@@ -50602,7 +50762,7 @@
             </a:pPr>
             <a:r>
               <a:rPr lang="en-US" dirty="0"/>
-              <a:t>Switched to label encoding for simplicity and to preserve original column structure</a:t>
+              <a:t>Column mismatch between test and validation sets​</a:t>
             </a:r>
           </a:p>
           <a:p>
@@ -50615,15 +50775,7 @@
             </a:pPr>
             <a:r>
               <a:rPr lang="en-US" dirty="0"/>
-              <a:t>Saved </a:t>
-            </a:r>
-            <a:r>
-              <a:rPr lang="en-US" dirty="0" err="1"/>
-              <a:t>LabelEncoder</a:t>
-            </a:r>
-            <a:r>
-              <a:rPr lang="en-US" dirty="0"/>
-              <a:t> instances in a dictionary to ensure consistent encoding across training and validation datasets</a:t>
+              <a:t>Dropped 3 test-only columns to align datasets​</a:t>
             </a:r>
           </a:p>
           <a:p>
@@ -50752,19 +50904,6 @@
             <a:r>
               <a:rPr lang="en" dirty="0"/>
               <a:t>Original index for reference</a:t>
-            </a:r>
-          </a:p>
-          <a:p>
-            <a:pPr marL="171450" indent="-171450">
-              <a:spcAft>
-                <a:spcPts val="600"/>
-              </a:spcAft>
-              <a:buFont typeface="Arial" panose="020B0604020202020204" pitchFamily="34" charset="0"/>
-              <a:buChar char="•"/>
-            </a:pPr>
-            <a:r>
-              <a:rPr lang="en" dirty="0"/>
-              <a:t>Original column names and structure for readability</a:t>
             </a:r>
           </a:p>
           <a:p>
@@ -50868,22 +51007,737 @@
             <p:ph type="title"/>
           </p:nvPr>
         </p:nvSpPr>
-        <p:spPr/>
+        <p:spPr>
+          <a:xfrm>
+            <a:off x="760052" y="409321"/>
+            <a:ext cx="10272000" cy="763600"/>
+          </a:xfrm>
+        </p:spPr>
         <p:txBody>
           <a:bodyPr/>
           <a:lstStyle/>
           <a:p>
             <a:r>
               <a:rPr lang="en-US" dirty="0"/>
-              <a:t>Pictures??</a:t>
+              <a:t>Preprocessing the Data</a:t>
             </a:r>
           </a:p>
         </p:txBody>
       </p:sp>
+      <p:grpSp>
+        <p:nvGrpSpPr>
+          <p:cNvPr id="22" name="Group 21">
+            <a:extLst>
+              <a:ext uri="{FF2B5EF4-FFF2-40B4-BE49-F238E27FC236}">
+                <a16:creationId xmlns:a16="http://schemas.microsoft.com/office/drawing/2014/main" id="{1BAF416C-9CAD-041F-BA6C-690836518ADE}"/>
+              </a:ext>
+            </a:extLst>
+          </p:cNvPr>
+          <p:cNvGrpSpPr/>
+          <p:nvPr/>
+        </p:nvGrpSpPr>
+        <p:grpSpPr>
+          <a:xfrm>
+            <a:off x="748985" y="1162932"/>
+            <a:ext cx="10202200" cy="2272056"/>
+            <a:chOff x="748985" y="1067902"/>
+            <a:chExt cx="10202200" cy="2272056"/>
+          </a:xfrm>
+        </p:grpSpPr>
+        <p:grpSp>
+          <p:nvGrpSpPr>
+            <p:cNvPr id="12" name="Group 11">
+              <a:extLst>
+                <a:ext uri="{FF2B5EF4-FFF2-40B4-BE49-F238E27FC236}">
+                  <a16:creationId xmlns:a16="http://schemas.microsoft.com/office/drawing/2014/main" id="{A391FC99-E13C-F9AE-62BC-9C397C25D698}"/>
+                </a:ext>
+              </a:extLst>
+            </p:cNvPr>
+            <p:cNvGrpSpPr>
+              <a:grpSpLocks noChangeAspect="1"/>
+            </p:cNvGrpSpPr>
+            <p:nvPr/>
+          </p:nvGrpSpPr>
+          <p:grpSpPr>
+            <a:xfrm>
+              <a:off x="840920" y="1579362"/>
+              <a:ext cx="10110265" cy="1760596"/>
+              <a:chOff x="326571" y="1540073"/>
+              <a:chExt cx="9790303" cy="1704878"/>
+            </a:xfrm>
+          </p:grpSpPr>
+          <p:pic>
+            <p:nvPicPr>
+              <p:cNvPr id="9" name="Picture 8" descr="A screenshot of a graph&#10;&#10;Description automatically generated">
+                <a:extLst>
+                  <a:ext uri="{FF2B5EF4-FFF2-40B4-BE49-F238E27FC236}">
+                    <a16:creationId xmlns:a16="http://schemas.microsoft.com/office/drawing/2014/main" id="{60A7D276-E1DB-1FE0-15D3-A1EC9E52AA9D}"/>
+                  </a:ext>
+                </a:extLst>
+              </p:cNvPr>
+              <p:cNvPicPr>
+                <a:picLocks noChangeAspect="1"/>
+              </p:cNvPicPr>
+              <p:nvPr/>
+            </p:nvPicPr>
+            <p:blipFill rotWithShape="1">
+              <a:blip r:embed="rId2">
+                <a:extLst>
+                  <a:ext uri="{28A0092B-C50C-407E-A947-70E740481C1C}">
+                    <a14:useLocalDpi xmlns:a14="http://schemas.microsoft.com/office/drawing/2010/main" val="0"/>
+                  </a:ext>
+                </a:extLst>
+              </a:blip>
+              <a:srcRect t="2790"/>
+              <a:stretch/>
+            </p:blipFill>
+            <p:spPr>
+              <a:xfrm>
+                <a:off x="326571" y="1540073"/>
+                <a:ext cx="9307285" cy="1704878"/>
+              </a:xfrm>
+              <a:prstGeom prst="rect">
+                <a:avLst/>
+              </a:prstGeom>
+            </p:spPr>
+          </p:pic>
+          <p:pic>
+            <p:nvPicPr>
+              <p:cNvPr id="11" name="Picture 10" descr="A screenshot of a black screen&#10;&#10;Description automatically generated">
+                <a:extLst>
+                  <a:ext uri="{FF2B5EF4-FFF2-40B4-BE49-F238E27FC236}">
+                    <a16:creationId xmlns:a16="http://schemas.microsoft.com/office/drawing/2014/main" id="{D9765030-D52E-E6D0-4762-74DA815CDFDF}"/>
+                  </a:ext>
+                </a:extLst>
+              </p:cNvPr>
+              <p:cNvPicPr>
+                <a:picLocks noChangeAspect="1"/>
+              </p:cNvPicPr>
+              <p:nvPr/>
+            </p:nvPicPr>
+            <p:blipFill rotWithShape="1">
+              <a:blip r:embed="rId3">
+                <a:extLst>
+                  <a:ext uri="{28A0092B-C50C-407E-A947-70E740481C1C}">
+                    <a14:useLocalDpi xmlns:a14="http://schemas.microsoft.com/office/drawing/2010/main" val="0"/>
+                  </a:ext>
+                </a:extLst>
+              </a:blip>
+              <a:srcRect l="95292" t="4660"/>
+              <a:stretch/>
+            </p:blipFill>
+            <p:spPr>
+              <a:xfrm>
+                <a:off x="9633856" y="1540073"/>
+                <a:ext cx="483018" cy="1704878"/>
+              </a:xfrm>
+              <a:prstGeom prst="rect">
+                <a:avLst/>
+              </a:prstGeom>
+            </p:spPr>
+          </p:pic>
+        </p:grpSp>
+        <p:sp>
+          <p:nvSpPr>
+            <p:cNvPr id="20" name="Google Shape;296;p35">
+              <a:extLst>
+                <a:ext uri="{FF2B5EF4-FFF2-40B4-BE49-F238E27FC236}">
+                  <a16:creationId xmlns:a16="http://schemas.microsoft.com/office/drawing/2014/main" id="{7A1EF8C1-B72A-081C-EF23-BDFF1804C5E9}"/>
+                </a:ext>
+              </a:extLst>
+            </p:cNvPr>
+            <p:cNvSpPr txBox="1">
+              <a:spLocks/>
+            </p:cNvSpPr>
+            <p:nvPr/>
+          </p:nvSpPr>
+          <p:spPr>
+            <a:xfrm>
+              <a:off x="748985" y="1067902"/>
+              <a:ext cx="2687726" cy="578129"/>
+            </a:xfrm>
+            <a:prstGeom prst="rect">
+              <a:avLst/>
+            </a:prstGeom>
+            <a:ln>
+              <a:noFill/>
+            </a:ln>
+          </p:spPr>
+          <p:txBody>
+            <a:bodyPr spcFirstLastPara="1" wrap="square" lIns="121900" tIns="121900" rIns="121900" bIns="121900" anchor="b" anchorCtr="0">
+              <a:noAutofit/>
+            </a:bodyPr>
+            <a:lstStyle>
+              <a:defPPr marR="0" lvl="0" algn="l" rtl="0">
+                <a:lnSpc>
+                  <a:spcPct val="100000"/>
+                </a:lnSpc>
+                <a:spcBef>
+                  <a:spcPts val="0"/>
+                </a:spcBef>
+                <a:spcAft>
+                  <a:spcPts val="0"/>
+                </a:spcAft>
+              </a:defPPr>
+              <a:lvl1pPr marR="0" lvl="0" algn="l" rtl="0">
+                <a:lnSpc>
+                  <a:spcPct val="100000"/>
+                </a:lnSpc>
+                <a:spcBef>
+                  <a:spcPts val="0"/>
+                </a:spcBef>
+                <a:spcAft>
+                  <a:spcPts val="0"/>
+                </a:spcAft>
+                <a:buClr>
+                  <a:srgbClr val="000000"/>
+                </a:buClr>
+                <a:buFont typeface="Arial"/>
+                <a:defRPr sz="1867" b="0" i="0" u="none" strike="noStrike" cap="none">
+                  <a:solidFill>
+                    <a:srgbClr val="000000"/>
+                  </a:solidFill>
+                  <a:latin typeface="Arial"/>
+                  <a:ea typeface="Arial"/>
+                  <a:cs typeface="Arial"/>
+                  <a:sym typeface="Arial"/>
+                </a:defRPr>
+              </a:lvl1pPr>
+              <a:lvl2pPr marR="0" lvl="1" algn="l" rtl="0">
+                <a:lnSpc>
+                  <a:spcPct val="100000"/>
+                </a:lnSpc>
+                <a:spcBef>
+                  <a:spcPts val="0"/>
+                </a:spcBef>
+                <a:spcAft>
+                  <a:spcPts val="0"/>
+                </a:spcAft>
+                <a:buClr>
+                  <a:srgbClr val="000000"/>
+                </a:buClr>
+                <a:buFont typeface="Arial"/>
+                <a:defRPr sz="1867" b="0" i="0" u="none" strike="noStrike" cap="none">
+                  <a:solidFill>
+                    <a:srgbClr val="000000"/>
+                  </a:solidFill>
+                  <a:latin typeface="Arial"/>
+                  <a:ea typeface="Arial"/>
+                  <a:cs typeface="Arial"/>
+                  <a:sym typeface="Arial"/>
+                </a:defRPr>
+              </a:lvl2pPr>
+              <a:lvl3pPr marR="0" lvl="2" algn="l" rtl="0">
+                <a:lnSpc>
+                  <a:spcPct val="100000"/>
+                </a:lnSpc>
+                <a:spcBef>
+                  <a:spcPts val="0"/>
+                </a:spcBef>
+                <a:spcAft>
+                  <a:spcPts val="0"/>
+                </a:spcAft>
+                <a:buClr>
+                  <a:srgbClr val="000000"/>
+                </a:buClr>
+                <a:buFont typeface="Arial"/>
+                <a:defRPr sz="1867" b="0" i="0" u="none" strike="noStrike" cap="none">
+                  <a:solidFill>
+                    <a:srgbClr val="000000"/>
+                  </a:solidFill>
+                  <a:latin typeface="Arial"/>
+                  <a:ea typeface="Arial"/>
+                  <a:cs typeface="Arial"/>
+                  <a:sym typeface="Arial"/>
+                </a:defRPr>
+              </a:lvl3pPr>
+              <a:lvl4pPr marR="0" lvl="3" algn="l" rtl="0">
+                <a:lnSpc>
+                  <a:spcPct val="100000"/>
+                </a:lnSpc>
+                <a:spcBef>
+                  <a:spcPts val="0"/>
+                </a:spcBef>
+                <a:spcAft>
+                  <a:spcPts val="0"/>
+                </a:spcAft>
+                <a:buClr>
+                  <a:srgbClr val="000000"/>
+                </a:buClr>
+                <a:buFont typeface="Arial"/>
+                <a:defRPr sz="1867" b="0" i="0" u="none" strike="noStrike" cap="none">
+                  <a:solidFill>
+                    <a:srgbClr val="000000"/>
+                  </a:solidFill>
+                  <a:latin typeface="Arial"/>
+                  <a:ea typeface="Arial"/>
+                  <a:cs typeface="Arial"/>
+                  <a:sym typeface="Arial"/>
+                </a:defRPr>
+              </a:lvl4pPr>
+              <a:lvl5pPr marR="0" lvl="4" algn="l" rtl="0">
+                <a:lnSpc>
+                  <a:spcPct val="100000"/>
+                </a:lnSpc>
+                <a:spcBef>
+                  <a:spcPts val="0"/>
+                </a:spcBef>
+                <a:spcAft>
+                  <a:spcPts val="0"/>
+                </a:spcAft>
+                <a:buClr>
+                  <a:srgbClr val="000000"/>
+                </a:buClr>
+                <a:buFont typeface="Arial"/>
+                <a:defRPr sz="1867" b="0" i="0" u="none" strike="noStrike" cap="none">
+                  <a:solidFill>
+                    <a:srgbClr val="000000"/>
+                  </a:solidFill>
+                  <a:latin typeface="Arial"/>
+                  <a:ea typeface="Arial"/>
+                  <a:cs typeface="Arial"/>
+                  <a:sym typeface="Arial"/>
+                </a:defRPr>
+              </a:lvl5pPr>
+              <a:lvl6pPr marR="0" lvl="5" algn="l" rtl="0">
+                <a:lnSpc>
+                  <a:spcPct val="100000"/>
+                </a:lnSpc>
+                <a:spcBef>
+                  <a:spcPts val="0"/>
+                </a:spcBef>
+                <a:spcAft>
+                  <a:spcPts val="0"/>
+                </a:spcAft>
+                <a:buClr>
+                  <a:srgbClr val="000000"/>
+                </a:buClr>
+                <a:buFont typeface="Arial"/>
+                <a:defRPr sz="1867" b="0" i="0" u="none" strike="noStrike" cap="none">
+                  <a:solidFill>
+                    <a:srgbClr val="000000"/>
+                  </a:solidFill>
+                  <a:latin typeface="Arial"/>
+                  <a:ea typeface="Arial"/>
+                  <a:cs typeface="Arial"/>
+                  <a:sym typeface="Arial"/>
+                </a:defRPr>
+              </a:lvl6pPr>
+              <a:lvl7pPr marR="0" lvl="6" algn="l" rtl="0">
+                <a:lnSpc>
+                  <a:spcPct val="100000"/>
+                </a:lnSpc>
+                <a:spcBef>
+                  <a:spcPts val="0"/>
+                </a:spcBef>
+                <a:spcAft>
+                  <a:spcPts val="0"/>
+                </a:spcAft>
+                <a:buClr>
+                  <a:srgbClr val="000000"/>
+                </a:buClr>
+                <a:buFont typeface="Arial"/>
+                <a:defRPr sz="1867" b="0" i="0" u="none" strike="noStrike" cap="none">
+                  <a:solidFill>
+                    <a:srgbClr val="000000"/>
+                  </a:solidFill>
+                  <a:latin typeface="Arial"/>
+                  <a:ea typeface="Arial"/>
+                  <a:cs typeface="Arial"/>
+                  <a:sym typeface="Arial"/>
+                </a:defRPr>
+              </a:lvl7pPr>
+              <a:lvl8pPr marR="0" lvl="7" algn="l" rtl="0">
+                <a:lnSpc>
+                  <a:spcPct val="100000"/>
+                </a:lnSpc>
+                <a:spcBef>
+                  <a:spcPts val="0"/>
+                </a:spcBef>
+                <a:spcAft>
+                  <a:spcPts val="0"/>
+                </a:spcAft>
+                <a:buClr>
+                  <a:srgbClr val="000000"/>
+                </a:buClr>
+                <a:buFont typeface="Arial"/>
+                <a:defRPr sz="1867" b="0" i="0" u="none" strike="noStrike" cap="none">
+                  <a:solidFill>
+                    <a:srgbClr val="000000"/>
+                  </a:solidFill>
+                  <a:latin typeface="Arial"/>
+                  <a:ea typeface="Arial"/>
+                  <a:cs typeface="Arial"/>
+                  <a:sym typeface="Arial"/>
+                </a:defRPr>
+              </a:lvl8pPr>
+              <a:lvl9pPr marR="0" lvl="8" algn="l" rtl="0">
+                <a:lnSpc>
+                  <a:spcPct val="100000"/>
+                </a:lnSpc>
+                <a:spcBef>
+                  <a:spcPts val="0"/>
+                </a:spcBef>
+                <a:spcAft>
+                  <a:spcPts val="0"/>
+                </a:spcAft>
+                <a:buClr>
+                  <a:srgbClr val="000000"/>
+                </a:buClr>
+                <a:buFont typeface="Arial"/>
+                <a:defRPr sz="1867" b="0" i="0" u="none" strike="noStrike" cap="none">
+                  <a:solidFill>
+                    <a:srgbClr val="000000"/>
+                  </a:solidFill>
+                  <a:latin typeface="Arial"/>
+                  <a:ea typeface="Arial"/>
+                  <a:cs typeface="Arial"/>
+                  <a:sym typeface="Arial"/>
+                </a:defRPr>
+              </a:lvl9pPr>
+            </a:lstStyle>
+            <a:p>
+              <a:r>
+                <a:rPr lang="en-US" sz="1600" kern="0" dirty="0">
+                  <a:latin typeface="Poppins" pitchFamily="2" charset="77"/>
+                  <a:cs typeface="Poppins" pitchFamily="2" charset="77"/>
+                </a:rPr>
+                <a:t>Test/Train Dataset</a:t>
+              </a:r>
+            </a:p>
+          </p:txBody>
+        </p:sp>
+      </p:grpSp>
+      <p:grpSp>
+        <p:nvGrpSpPr>
+          <p:cNvPr id="23" name="Group 22">
+            <a:extLst>
+              <a:ext uri="{FF2B5EF4-FFF2-40B4-BE49-F238E27FC236}">
+                <a16:creationId xmlns:a16="http://schemas.microsoft.com/office/drawing/2014/main" id="{84C25FE6-C470-A381-3E3E-5108BB022F3C}"/>
+              </a:ext>
+            </a:extLst>
+          </p:cNvPr>
+          <p:cNvGrpSpPr/>
+          <p:nvPr/>
+        </p:nvGrpSpPr>
+        <p:grpSpPr>
+          <a:xfrm>
+            <a:off x="748985" y="3674330"/>
+            <a:ext cx="10202200" cy="2462114"/>
+            <a:chOff x="748985" y="3275745"/>
+            <a:chExt cx="10202200" cy="2462114"/>
+          </a:xfrm>
+        </p:grpSpPr>
+        <p:pic>
+          <p:nvPicPr>
+            <p:cNvPr id="18" name="Picture 17" descr="A screenshot of a graph&#10;&#10;Description automatically generated">
+              <a:extLst>
+                <a:ext uri="{FF2B5EF4-FFF2-40B4-BE49-F238E27FC236}">
+                  <a16:creationId xmlns:a16="http://schemas.microsoft.com/office/drawing/2014/main" id="{E610BC95-28FE-797C-F368-775ABE0BF159}"/>
+                </a:ext>
+              </a:extLst>
+            </p:cNvPr>
+            <p:cNvPicPr>
+              <a:picLocks noChangeAspect="1"/>
+            </p:cNvPicPr>
+            <p:nvPr/>
+          </p:nvPicPr>
+          <p:blipFill rotWithShape="1">
+            <a:blip r:embed="rId4">
+              <a:extLst>
+                <a:ext uri="{28A0092B-C50C-407E-A947-70E740481C1C}">
+                  <a14:useLocalDpi xmlns:a14="http://schemas.microsoft.com/office/drawing/2010/main" val="0"/>
+                </a:ext>
+              </a:extLst>
+            </a:blip>
+            <a:srcRect t="2680"/>
+            <a:stretch/>
+          </p:blipFill>
+          <p:spPr>
+            <a:xfrm>
+              <a:off x="840920" y="3789660"/>
+              <a:ext cx="10110265" cy="1948199"/>
+            </a:xfrm>
+            <a:prstGeom prst="rect">
+              <a:avLst/>
+            </a:prstGeom>
+          </p:spPr>
+        </p:pic>
+        <p:sp>
+          <p:nvSpPr>
+            <p:cNvPr id="21" name="Google Shape;296;p35">
+              <a:extLst>
+                <a:ext uri="{FF2B5EF4-FFF2-40B4-BE49-F238E27FC236}">
+                  <a16:creationId xmlns:a16="http://schemas.microsoft.com/office/drawing/2014/main" id="{4A15378A-F09D-966A-48CF-964EE02337BB}"/>
+                </a:ext>
+              </a:extLst>
+            </p:cNvPr>
+            <p:cNvSpPr txBox="1">
+              <a:spLocks/>
+            </p:cNvSpPr>
+            <p:nvPr/>
+          </p:nvSpPr>
+          <p:spPr>
+            <a:xfrm>
+              <a:off x="748985" y="3275745"/>
+              <a:ext cx="2687726" cy="578129"/>
+            </a:xfrm>
+            <a:prstGeom prst="rect">
+              <a:avLst/>
+            </a:prstGeom>
+            <a:ln>
+              <a:noFill/>
+            </a:ln>
+          </p:spPr>
+          <p:txBody>
+            <a:bodyPr spcFirstLastPara="1" wrap="square" lIns="121900" tIns="121900" rIns="121900" bIns="121900" anchor="b" anchorCtr="0">
+              <a:noAutofit/>
+            </a:bodyPr>
+            <a:lstStyle>
+              <a:defPPr marR="0" lvl="0" algn="l" rtl="0">
+                <a:lnSpc>
+                  <a:spcPct val="100000"/>
+                </a:lnSpc>
+                <a:spcBef>
+                  <a:spcPts val="0"/>
+                </a:spcBef>
+                <a:spcAft>
+                  <a:spcPts val="0"/>
+                </a:spcAft>
+              </a:defPPr>
+              <a:lvl1pPr marR="0" lvl="0" algn="l" rtl="0">
+                <a:lnSpc>
+                  <a:spcPct val="100000"/>
+                </a:lnSpc>
+                <a:spcBef>
+                  <a:spcPts val="0"/>
+                </a:spcBef>
+                <a:spcAft>
+                  <a:spcPts val="0"/>
+                </a:spcAft>
+                <a:buClr>
+                  <a:srgbClr val="000000"/>
+                </a:buClr>
+                <a:buFont typeface="Arial"/>
+                <a:defRPr sz="1867" b="0" i="0" u="none" strike="noStrike" cap="none">
+                  <a:solidFill>
+                    <a:srgbClr val="000000"/>
+                  </a:solidFill>
+                  <a:latin typeface="Arial"/>
+                  <a:ea typeface="Arial"/>
+                  <a:cs typeface="Arial"/>
+                  <a:sym typeface="Arial"/>
+                </a:defRPr>
+              </a:lvl1pPr>
+              <a:lvl2pPr marR="0" lvl="1" algn="l" rtl="0">
+                <a:lnSpc>
+                  <a:spcPct val="100000"/>
+                </a:lnSpc>
+                <a:spcBef>
+                  <a:spcPts val="0"/>
+                </a:spcBef>
+                <a:spcAft>
+                  <a:spcPts val="0"/>
+                </a:spcAft>
+                <a:buClr>
+                  <a:srgbClr val="000000"/>
+                </a:buClr>
+                <a:buFont typeface="Arial"/>
+                <a:defRPr sz="1867" b="0" i="0" u="none" strike="noStrike" cap="none">
+                  <a:solidFill>
+                    <a:srgbClr val="000000"/>
+                  </a:solidFill>
+                  <a:latin typeface="Arial"/>
+                  <a:ea typeface="Arial"/>
+                  <a:cs typeface="Arial"/>
+                  <a:sym typeface="Arial"/>
+                </a:defRPr>
+              </a:lvl2pPr>
+              <a:lvl3pPr marR="0" lvl="2" algn="l" rtl="0">
+                <a:lnSpc>
+                  <a:spcPct val="100000"/>
+                </a:lnSpc>
+                <a:spcBef>
+                  <a:spcPts val="0"/>
+                </a:spcBef>
+                <a:spcAft>
+                  <a:spcPts val="0"/>
+                </a:spcAft>
+                <a:buClr>
+                  <a:srgbClr val="000000"/>
+                </a:buClr>
+                <a:buFont typeface="Arial"/>
+                <a:defRPr sz="1867" b="0" i="0" u="none" strike="noStrike" cap="none">
+                  <a:solidFill>
+                    <a:srgbClr val="000000"/>
+                  </a:solidFill>
+                  <a:latin typeface="Arial"/>
+                  <a:ea typeface="Arial"/>
+                  <a:cs typeface="Arial"/>
+                  <a:sym typeface="Arial"/>
+                </a:defRPr>
+              </a:lvl3pPr>
+              <a:lvl4pPr marR="0" lvl="3" algn="l" rtl="0">
+                <a:lnSpc>
+                  <a:spcPct val="100000"/>
+                </a:lnSpc>
+                <a:spcBef>
+                  <a:spcPts val="0"/>
+                </a:spcBef>
+                <a:spcAft>
+                  <a:spcPts val="0"/>
+                </a:spcAft>
+                <a:buClr>
+                  <a:srgbClr val="000000"/>
+                </a:buClr>
+                <a:buFont typeface="Arial"/>
+                <a:defRPr sz="1867" b="0" i="0" u="none" strike="noStrike" cap="none">
+                  <a:solidFill>
+                    <a:srgbClr val="000000"/>
+                  </a:solidFill>
+                  <a:latin typeface="Arial"/>
+                  <a:ea typeface="Arial"/>
+                  <a:cs typeface="Arial"/>
+                  <a:sym typeface="Arial"/>
+                </a:defRPr>
+              </a:lvl4pPr>
+              <a:lvl5pPr marR="0" lvl="4" algn="l" rtl="0">
+                <a:lnSpc>
+                  <a:spcPct val="100000"/>
+                </a:lnSpc>
+                <a:spcBef>
+                  <a:spcPts val="0"/>
+                </a:spcBef>
+                <a:spcAft>
+                  <a:spcPts val="0"/>
+                </a:spcAft>
+                <a:buClr>
+                  <a:srgbClr val="000000"/>
+                </a:buClr>
+                <a:buFont typeface="Arial"/>
+                <a:defRPr sz="1867" b="0" i="0" u="none" strike="noStrike" cap="none">
+                  <a:solidFill>
+                    <a:srgbClr val="000000"/>
+                  </a:solidFill>
+                  <a:latin typeface="Arial"/>
+                  <a:ea typeface="Arial"/>
+                  <a:cs typeface="Arial"/>
+                  <a:sym typeface="Arial"/>
+                </a:defRPr>
+              </a:lvl5pPr>
+              <a:lvl6pPr marR="0" lvl="5" algn="l" rtl="0">
+                <a:lnSpc>
+                  <a:spcPct val="100000"/>
+                </a:lnSpc>
+                <a:spcBef>
+                  <a:spcPts val="0"/>
+                </a:spcBef>
+                <a:spcAft>
+                  <a:spcPts val="0"/>
+                </a:spcAft>
+                <a:buClr>
+                  <a:srgbClr val="000000"/>
+                </a:buClr>
+                <a:buFont typeface="Arial"/>
+                <a:defRPr sz="1867" b="0" i="0" u="none" strike="noStrike" cap="none">
+                  <a:solidFill>
+                    <a:srgbClr val="000000"/>
+                  </a:solidFill>
+                  <a:latin typeface="Arial"/>
+                  <a:ea typeface="Arial"/>
+                  <a:cs typeface="Arial"/>
+                  <a:sym typeface="Arial"/>
+                </a:defRPr>
+              </a:lvl6pPr>
+              <a:lvl7pPr marR="0" lvl="6" algn="l" rtl="0">
+                <a:lnSpc>
+                  <a:spcPct val="100000"/>
+                </a:lnSpc>
+                <a:spcBef>
+                  <a:spcPts val="0"/>
+                </a:spcBef>
+                <a:spcAft>
+                  <a:spcPts val="0"/>
+                </a:spcAft>
+                <a:buClr>
+                  <a:srgbClr val="000000"/>
+                </a:buClr>
+                <a:buFont typeface="Arial"/>
+                <a:defRPr sz="1867" b="0" i="0" u="none" strike="noStrike" cap="none">
+                  <a:solidFill>
+                    <a:srgbClr val="000000"/>
+                  </a:solidFill>
+                  <a:latin typeface="Arial"/>
+                  <a:ea typeface="Arial"/>
+                  <a:cs typeface="Arial"/>
+                  <a:sym typeface="Arial"/>
+                </a:defRPr>
+              </a:lvl7pPr>
+              <a:lvl8pPr marR="0" lvl="7" algn="l" rtl="0">
+                <a:lnSpc>
+                  <a:spcPct val="100000"/>
+                </a:lnSpc>
+                <a:spcBef>
+                  <a:spcPts val="0"/>
+                </a:spcBef>
+                <a:spcAft>
+                  <a:spcPts val="0"/>
+                </a:spcAft>
+                <a:buClr>
+                  <a:srgbClr val="000000"/>
+                </a:buClr>
+                <a:buFont typeface="Arial"/>
+                <a:defRPr sz="1867" b="0" i="0" u="none" strike="noStrike" cap="none">
+                  <a:solidFill>
+                    <a:srgbClr val="000000"/>
+                  </a:solidFill>
+                  <a:latin typeface="Arial"/>
+                  <a:ea typeface="Arial"/>
+                  <a:cs typeface="Arial"/>
+                  <a:sym typeface="Arial"/>
+                </a:defRPr>
+              </a:lvl8pPr>
+              <a:lvl9pPr marR="0" lvl="8" algn="l" rtl="0">
+                <a:lnSpc>
+                  <a:spcPct val="100000"/>
+                </a:lnSpc>
+                <a:spcBef>
+                  <a:spcPts val="0"/>
+                </a:spcBef>
+                <a:spcAft>
+                  <a:spcPts val="0"/>
+                </a:spcAft>
+                <a:buClr>
+                  <a:srgbClr val="000000"/>
+                </a:buClr>
+                <a:buFont typeface="Arial"/>
+                <a:defRPr sz="1867" b="0" i="0" u="none" strike="noStrike" cap="none">
+                  <a:solidFill>
+                    <a:srgbClr val="000000"/>
+                  </a:solidFill>
+                  <a:latin typeface="Arial"/>
+                  <a:ea typeface="Arial"/>
+                  <a:cs typeface="Arial"/>
+                  <a:sym typeface="Arial"/>
+                </a:defRPr>
+              </a:lvl9pPr>
+            </a:lstStyle>
+            <a:p>
+              <a:r>
+                <a:rPr lang="en-US" sz="1600" kern="0" dirty="0">
+                  <a:latin typeface="Poppins" pitchFamily="2" charset="77"/>
+                  <a:cs typeface="Poppins" pitchFamily="2" charset="77"/>
+                </a:rPr>
+                <a:t>Validation Dataset</a:t>
+              </a:r>
+            </a:p>
+          </p:txBody>
+        </p:sp>
+      </p:grpSp>
     </p:spTree>
     <p:extLst>
       <p:ext uri="{BB962C8B-B14F-4D97-AF65-F5344CB8AC3E}">
-        <p14:creationId xmlns:p14="http://schemas.microsoft.com/office/powerpoint/2010/main" val="3682108917"/>
+        <p14:creationId xmlns:p14="http://schemas.microsoft.com/office/powerpoint/2010/main" val="3936872360"/>
       </p:ext>
     </p:extLst>
   </p:cSld>
@@ -51417,7 +52271,7 @@
             </a:pPr>
             <a:r>
               <a:rPr lang="en-US" dirty="0"/>
-              <a:t>Modified loops to suppress excessive warning messages</a:t>
+              <a:t>Tuned eta and max_iter to avoid models that didn’t converge </a:t>
             </a:r>
           </a:p>
           <a:p>
@@ -51464,7 +52318,7 @@
               <a:buChar char="•"/>
             </a:pPr>
             <a:r>
-              <a:rPr lang="en-US" b="1" dirty="0"/>
+              <a:rPr lang="en-US" dirty="0"/>
               <a:t>Manual Perceptron</a:t>
             </a:r>
           </a:p>
@@ -51478,7 +52332,7 @@
             </a:pPr>
             <a:r>
               <a:rPr lang="en-US" dirty="0"/>
-              <a:t>eta 0.0003 and n_iter 20</a:t>
+              <a:t>eta 0.001 and n_iter 25</a:t>
             </a:r>
           </a:p>
           <a:p>
@@ -51491,7 +52345,7 @@
             </a:pPr>
             <a:r>
               <a:rPr lang="en-US" dirty="0"/>
-              <a:t>Accuracy: 0.8298</a:t>
+              <a:t>Accuracy: 82.07%</a:t>
             </a:r>
           </a:p>
           <a:p>
@@ -51517,7 +52371,7 @@
             </a:pPr>
             <a:r>
               <a:rPr lang="en-US" dirty="0"/>
-              <a:t>eta 0.00005 and n_iter 10</a:t>
+              <a:t>eta 0.0001 and n_iter 10</a:t>
             </a:r>
           </a:p>
           <a:p>
@@ -51530,11 +52384,24 @@
             </a:pPr>
             <a:r>
               <a:rPr lang="en-US" dirty="0"/>
-              <a:t>Accuracy: 0.8215</a:t>
+              <a:t>Accuracy: 84.30%</a:t>
             </a:r>
           </a:p>
           <a:p>
             <a:pPr marL="171450" indent="-171450">
+              <a:spcAft>
+                <a:spcPts val="600"/>
+              </a:spcAft>
+              <a:buFont typeface="Arial" panose="020B0604020202020204" pitchFamily="34" charset="0"/>
+              <a:buChar char="•"/>
+            </a:pPr>
+            <a:r>
+              <a:rPr lang="en-US" b="1" dirty="0"/>
+              <a:t>Sklearn Perceptron</a:t>
+            </a:r>
+          </a:p>
+          <a:p>
+            <a:pPr marL="628650" lvl="1" indent="-171450" algn="l">
               <a:spcAft>
                 <a:spcPts val="600"/>
               </a:spcAft>
@@ -51543,7 +52410,7 @@
             </a:pPr>
             <a:r>
               <a:rPr lang="en-US" dirty="0"/>
-              <a:t>Sklearn Perceptron</a:t>
+              <a:t>eta 0.01 and max_iter 20</a:t>
             </a:r>
           </a:p>
           <a:p>
@@ -51556,20 +52423,7 @@
             </a:pPr>
             <a:r>
               <a:rPr lang="en-US" dirty="0"/>
-              <a:t>eta 0.01 and max_iter 12</a:t>
-            </a:r>
-          </a:p>
-          <a:p>
-            <a:pPr marL="628650" lvl="1" indent="-171450" algn="l">
-              <a:spcAft>
-                <a:spcPts val="600"/>
-              </a:spcAft>
-              <a:buFont typeface="Arial" panose="020B0604020202020204" pitchFamily="34" charset="0"/>
-              <a:buChar char="•"/>
-            </a:pPr>
-            <a:r>
-              <a:rPr lang="en-US" dirty="0"/>
-              <a:t>Accuracy: 0.8138</a:t>
+              <a:t>Accuracy: 82.80%</a:t>
             </a:r>
           </a:p>
           <a:p>
@@ -51595,7 +52449,7 @@
             </a:pPr>
             <a:r>
               <a:rPr lang="en-US" dirty="0"/>
-              <a:t>eta 0.01 and max_iter 12</a:t>
+              <a:t>eta 1e-05 and max_iter 20</a:t>
             </a:r>
           </a:p>
           <a:p>
@@ -51608,7 +52462,7 @@
             </a:pPr>
             <a:r>
               <a:rPr lang="en-US" dirty="0"/>
-              <a:t>Accuracy: 0.8221</a:t>
+              <a:t>Accuracy: 83.55%</a:t>
             </a:r>
           </a:p>
         </p:txBody>
@@ -51752,6 +52606,64 @@
           </a:prstGeom>
         </p:spPr>
       </p:pic>
+      <p:sp>
+        <p:nvSpPr>
+          <p:cNvPr id="2" name="Rectangle 1">
+            <a:extLst>
+              <a:ext uri="{FF2B5EF4-FFF2-40B4-BE49-F238E27FC236}">
+                <a16:creationId xmlns:a16="http://schemas.microsoft.com/office/drawing/2014/main" id="{D437B3DE-7EA3-B68B-A110-7E01FC10A4C8}"/>
+              </a:ext>
+            </a:extLst>
+          </p:cNvPr>
+          <p:cNvSpPr/>
+          <p:nvPr/>
+        </p:nvSpPr>
+        <p:spPr>
+          <a:xfrm>
+            <a:off x="4876799" y="2830286"/>
+            <a:ext cx="1654629" cy="1676400"/>
+          </a:xfrm>
+          <a:prstGeom prst="rect">
+            <a:avLst/>
+          </a:prstGeom>
+          <a:solidFill>
+            <a:schemeClr val="bg2">
+              <a:lumMod val="60000"/>
+              <a:lumOff val="40000"/>
+              <a:alpha val="23137"/>
+            </a:schemeClr>
+          </a:solidFill>
+          <a:ln>
+            <a:solidFill>
+              <a:schemeClr val="bg2"/>
+            </a:solidFill>
+          </a:ln>
+        </p:spPr>
+        <p:style>
+          <a:lnRef idx="2">
+            <a:schemeClr val="accent1">
+              <a:shade val="15000"/>
+            </a:schemeClr>
+          </a:lnRef>
+          <a:fillRef idx="1">
+            <a:schemeClr val="accent1"/>
+          </a:fillRef>
+          <a:effectRef idx="0">
+            <a:schemeClr val="accent1"/>
+          </a:effectRef>
+          <a:fontRef idx="minor">
+            <a:schemeClr val="lt1"/>
+          </a:fontRef>
+        </p:style>
+        <p:txBody>
+          <a:bodyPr rtlCol="0" anchor="ctr"/>
+          <a:lstStyle/>
+          <a:p>
+            <a:pPr algn="ctr"/>
+            <a:endParaRPr lang="en-US"/>
+          </a:p>
+        </p:txBody>
+      </p:sp>
     </p:spTree>
     <p:extLst>
       <p:ext uri="{BB962C8B-B14F-4D97-AF65-F5344CB8AC3E}">
@@ -53116,15 +54028,6 @@
 </file>
 
 <file path=customXml/item1.xml><?xml version="1.0" encoding="utf-8"?>
-<?mso-contentType ?>
-<FormTemplates xmlns="http://schemas.microsoft.com/sharepoint/v3/contenttype/forms">
-  <Display>DocumentLibraryForm</Display>
-  <Edit>DocumentLibraryForm</Edit>
-  <New>DocumentLibraryForm</New>
-</FormTemplates>
-</file>
-
-<file path=customXml/item2.xml><?xml version="1.0" encoding="utf-8"?>
 <ct:contentTypeSchema xmlns:ct="http://schemas.microsoft.com/office/2006/metadata/contentType" xmlns:ma="http://schemas.microsoft.com/office/2006/metadata/properties/metaAttributes" ct:_="" ma:_="" ma:contentTypeName="Document" ma:contentTypeID="0x010100A2980AF668775C489F286D3ACC930043" ma:contentTypeVersion="3" ma:contentTypeDescription="Create a new document." ma:contentTypeScope="" ma:versionID="7c5c9651b1cc8a4dcfd74fcd40ef1255">
   <xsd:schema xmlns:xsd="http://www.w3.org/2001/XMLSchema" xmlns:xs="http://www.w3.org/2001/XMLSchema" xmlns:p="http://schemas.microsoft.com/office/2006/metadata/properties" xmlns:ns2="1f16dbf7-1624-42b0-94f0-c170d6d8c99c" targetNamespace="http://schemas.microsoft.com/office/2006/metadata/properties" ma:root="true" ma:fieldsID="3a6ed51a2a70db089d9b560b51ffe8cc" ns2:_="">
     <xsd:import namespace="1f16dbf7-1624-42b0-94f0-c170d6d8c99c"/>
@@ -53262,6 +54165,15 @@
 </ct:contentTypeSchema>
 </file>
 
+<file path=customXml/item2.xml><?xml version="1.0" encoding="utf-8"?>
+<?mso-contentType ?>
+<FormTemplates xmlns="http://schemas.microsoft.com/sharepoint/v3/contenttype/forms">
+  <Display>DocumentLibraryForm</Display>
+  <Edit>DocumentLibraryForm</Edit>
+  <New>DocumentLibraryForm</New>
+</FormTemplates>
+</file>
+
 <file path=customXml/item3.xml><?xml version="1.0" encoding="utf-8"?>
 <p:properties xmlns:p="http://schemas.microsoft.com/office/2006/metadata/properties" xmlns:xsi="http://www.w3.org/2001/XMLSchema-instance" xmlns:pc="http://schemas.microsoft.com/office/infopath/2007/PartnerControls">
   <documentManagement/>
@@ -53269,14 +54181,6 @@
 </file>
 
 <file path=customXml/itemProps1.xml><?xml version="1.0" encoding="utf-8"?>
-<ds:datastoreItem xmlns:ds="http://schemas.openxmlformats.org/officeDocument/2006/customXml" ds:itemID="{476E9091-9C02-40F7-8824-5283B494FEC7}">
-  <ds:schemaRefs>
-    <ds:schemaRef ds:uri="http://schemas.microsoft.com/sharepoint/v3/contenttype/forms"/>
-  </ds:schemaRefs>
-</ds:datastoreItem>
-</file>
-
-<file path=customXml/itemProps2.xml><?xml version="1.0" encoding="utf-8"?>
 <ds:datastoreItem xmlns:ds="http://schemas.openxmlformats.org/officeDocument/2006/customXml" ds:itemID="{58F29B6A-6356-441D-8343-7E25C4B84F9B}">
   <ds:schemaRefs>
     <ds:schemaRef ds:uri="http://schemas.microsoft.com/office/2006/metadata/contentType"/>
@@ -53290,6 +54194,14 @@
     <ds:schemaRef ds:uri="http://purl.org/dc/elements/1.1/"/>
     <ds:schemaRef ds:uri="http://purl.org/dc/terms/"/>
     <ds:schemaRef ds:uri="http://schemas.microsoft.com/internal/obd"/>
+  </ds:schemaRefs>
+</ds:datastoreItem>
+</file>
+
+<file path=customXml/itemProps2.xml><?xml version="1.0" encoding="utf-8"?>
+<ds:datastoreItem xmlns:ds="http://schemas.openxmlformats.org/officeDocument/2006/customXml" ds:itemID="{476E9091-9C02-40F7-8824-5283B494FEC7}">
+  <ds:schemaRefs>
+    <ds:schemaRef ds:uri="http://schemas.microsoft.com/sharepoint/v3/contenttype/forms"/>
   </ds:schemaRefs>
 </ds:datastoreItem>
 </file>

</xml_diff>